<commit_message>
unhide slide in slides5f
</commit_message>
<xml_diff>
--- a/fall11/slidesF11/slides5f.pptx
+++ b/fall11/slidesF11/slides5f.pptx
@@ -6633,7 +6633,7 @@
 </file>
 
 <file path=ppt/slides/slide10.xml><?xml version="1.0" encoding="utf-8"?>
-<p:sld xmlns:a="http://schemas.openxmlformats.org/drawingml/2006/main" xmlns:r="http://schemas.openxmlformats.org/officeDocument/2006/relationships" xmlns:p="http://schemas.openxmlformats.org/presentationml/2006/main" show="0">
+<p:sld xmlns:a="http://schemas.openxmlformats.org/drawingml/2006/main" xmlns:r="http://schemas.openxmlformats.org/officeDocument/2006/relationships" xmlns:p="http://schemas.openxmlformats.org/presentationml/2006/main">
   <p:cSld>
     <p:spTree>
       <p:nvGrpSpPr>
@@ -30751,7 +30751,7 @@
                             </p:stCondLst>
                             <p:childTnLst>
                               <p:par>
-                                <p:cTn id="5" presetID="35" presetClass="entr" presetSubtype="0" fill="hold" grpId="0" nodeType="afterEffect">
+                                <p:cTn id="5" presetID="9" presetClass="entr" presetSubtype="0" fill="hold" grpId="0" nodeType="afterEffect">
                                   <p:stCondLst>
                                     <p:cond delay="0"/>
                                   </p:stCondLst>
@@ -30759,6 +30759,59 @@
                                     <p:set>
                                       <p:cBhvr>
                                         <p:cTn id="6" dur="1" fill="hold">
+                                          <p:stCondLst>
+                                            <p:cond delay="0"/>
+                                          </p:stCondLst>
+                                        </p:cTn>
+                                        <p:tgtEl>
+                                          <p:spTgt spid="11"/>
+                                        </p:tgtEl>
+                                        <p:attrNameLst>
+                                          <p:attrName>style.visibility</p:attrName>
+                                        </p:attrNameLst>
+                                      </p:cBhvr>
+                                      <p:to>
+                                        <p:strVal val="visible"/>
+                                      </p:to>
+                                    </p:set>
+                                    <p:animEffect transition="in" filter="dissolve">
+                                      <p:cBhvr>
+                                        <p:cTn id="7" dur="1000"/>
+                                        <p:tgtEl>
+                                          <p:spTgt spid="11"/>
+                                        </p:tgtEl>
+                                      </p:cBhvr>
+                                    </p:animEffect>
+                                  </p:childTnLst>
+                                </p:cTn>
+                              </p:par>
+                            </p:childTnLst>
+                          </p:cTn>
+                        </p:par>
+                      </p:childTnLst>
+                    </p:cTn>
+                  </p:par>
+                  <p:par>
+                    <p:cTn id="8" fill="hold">
+                      <p:stCondLst>
+                        <p:cond delay="indefinite"/>
+                      </p:stCondLst>
+                      <p:childTnLst>
+                        <p:par>
+                          <p:cTn id="9" fill="hold">
+                            <p:stCondLst>
+                              <p:cond delay="0"/>
+                            </p:stCondLst>
+                            <p:childTnLst>
+                              <p:par>
+                                <p:cTn id="10" presetID="35" presetClass="entr" presetSubtype="0" fill="hold" grpId="0" nodeType="clickEffect">
+                                  <p:stCondLst>
+                                    <p:cond delay="0"/>
+                                  </p:stCondLst>
+                                  <p:childTnLst>
+                                    <p:set>
+                                      <p:cBhvr>
+                                        <p:cTn id="11" dur="1" fill="hold">
                                           <p:stCondLst>
                                             <p:cond delay="0"/>
                                           </p:stCondLst>
@@ -30776,7 +30829,7 @@
                                     </p:set>
                                     <p:animEffect transition="in" filter="fade">
                                       <p:cBhvr>
-                                        <p:cTn id="7" dur="500"/>
+                                        <p:cTn id="12" dur="500"/>
                                         <p:tgtEl>
                                           <p:spTgt spid="9"/>
                                         </p:tgtEl>
@@ -30784,7 +30837,7 @@
                                     </p:animEffect>
                                     <p:anim calcmode="lin" valueType="num">
                                       <p:cBhvr>
-                                        <p:cTn id="8" dur="500" fill="hold"/>
+                                        <p:cTn id="13" dur="500" fill="hold"/>
                                         <p:tgtEl>
                                           <p:spTgt spid="9"/>
                                         </p:tgtEl>
@@ -30807,7 +30860,7 @@
                                     </p:anim>
                                     <p:anim calcmode="lin" valueType="num">
                                       <p:cBhvr>
-                                        <p:cTn id="9" dur="500" fill="hold"/>
+                                        <p:cTn id="14" dur="500" fill="hold"/>
                                         <p:tgtEl>
                                           <p:spTgt spid="9"/>
                                         </p:tgtEl>
@@ -30830,7 +30883,7 @@
                                     </p:anim>
                                     <p:anim calcmode="lin" valueType="num">
                                       <p:cBhvr>
-                                        <p:cTn id="10" dur="500" fill="hold"/>
+                                        <p:cTn id="15" dur="500" fill="hold"/>
                                         <p:tgtEl>
                                           <p:spTgt spid="9"/>
                                         </p:tgtEl>
@@ -30851,50 +30904,6 @@
                                         </p:tav>
                                       </p:tavLst>
                                     </p:anim>
-                                  </p:childTnLst>
-                                </p:cTn>
-                              </p:par>
-                            </p:childTnLst>
-                          </p:cTn>
-                        </p:par>
-                        <p:par>
-                          <p:cTn id="11" fill="hold">
-                            <p:stCondLst>
-                              <p:cond delay="500"/>
-                            </p:stCondLst>
-                            <p:childTnLst>
-                              <p:par>
-                                <p:cTn id="12" presetID="9" presetClass="entr" presetSubtype="0" fill="hold" grpId="0" nodeType="afterEffect">
-                                  <p:stCondLst>
-                                    <p:cond delay="0"/>
-                                  </p:stCondLst>
-                                  <p:childTnLst>
-                                    <p:set>
-                                      <p:cBhvr>
-                                        <p:cTn id="13" dur="1" fill="hold">
-                                          <p:stCondLst>
-                                            <p:cond delay="0"/>
-                                          </p:stCondLst>
-                                        </p:cTn>
-                                        <p:tgtEl>
-                                          <p:spTgt spid="11"/>
-                                        </p:tgtEl>
-                                        <p:attrNameLst>
-                                          <p:attrName>style.visibility</p:attrName>
-                                        </p:attrNameLst>
-                                      </p:cBhvr>
-                                      <p:to>
-                                        <p:strVal val="visible"/>
-                                      </p:to>
-                                    </p:set>
-                                    <p:animEffect transition="in" filter="dissolve">
-                                      <p:cBhvr>
-                                        <p:cTn id="14" dur="500"/>
-                                        <p:tgtEl>
-                                          <p:spTgt spid="11"/>
-                                        </p:tgtEl>
-                                      </p:cBhvr>
-                                    </p:animEffect>
                                   </p:childTnLst>
                                 </p:cTn>
                               </p:par>

</xml_diff>